<commit_message>
Final review before submission
</commit_message>
<xml_diff>
--- a/img/ModelTransformation.pptx
+++ b/img/ModelTransformation.pptx
@@ -244,7 +244,7 @@
           <a:p>
             <a:fld id="{7C30EC8E-E0C2-4688-8A21-31FBB5C9B8D6}" type="datetimeFigureOut">
               <a:rPr lang="en-GB" smtClean="0"/>
-              <a:t>16/05/2022</a:t>
+              <a:t>01/09/2022</a:t>
             </a:fld>
             <a:endParaRPr lang="en-GB"/>
           </a:p>
@@ -414,7 +414,7 @@
           <a:p>
             <a:fld id="{7C30EC8E-E0C2-4688-8A21-31FBB5C9B8D6}" type="datetimeFigureOut">
               <a:rPr lang="en-GB" smtClean="0"/>
-              <a:t>16/05/2022</a:t>
+              <a:t>01/09/2022</a:t>
             </a:fld>
             <a:endParaRPr lang="en-GB"/>
           </a:p>
@@ -594,7 +594,7 @@
           <a:p>
             <a:fld id="{7C30EC8E-E0C2-4688-8A21-31FBB5C9B8D6}" type="datetimeFigureOut">
               <a:rPr lang="en-GB" smtClean="0"/>
-              <a:t>16/05/2022</a:t>
+              <a:t>01/09/2022</a:t>
             </a:fld>
             <a:endParaRPr lang="en-GB"/>
           </a:p>
@@ -764,7 +764,7 @@
           <a:p>
             <a:fld id="{7C30EC8E-E0C2-4688-8A21-31FBB5C9B8D6}" type="datetimeFigureOut">
               <a:rPr lang="en-GB" smtClean="0"/>
-              <a:t>16/05/2022</a:t>
+              <a:t>01/09/2022</a:t>
             </a:fld>
             <a:endParaRPr lang="en-GB"/>
           </a:p>
@@ -1010,7 +1010,7 @@
           <a:p>
             <a:fld id="{7C30EC8E-E0C2-4688-8A21-31FBB5C9B8D6}" type="datetimeFigureOut">
               <a:rPr lang="en-GB" smtClean="0"/>
-              <a:t>16/05/2022</a:t>
+              <a:t>01/09/2022</a:t>
             </a:fld>
             <a:endParaRPr lang="en-GB"/>
           </a:p>
@@ -1242,7 +1242,7 @@
           <a:p>
             <a:fld id="{7C30EC8E-E0C2-4688-8A21-31FBB5C9B8D6}" type="datetimeFigureOut">
               <a:rPr lang="en-GB" smtClean="0"/>
-              <a:t>16/05/2022</a:t>
+              <a:t>01/09/2022</a:t>
             </a:fld>
             <a:endParaRPr lang="en-GB"/>
           </a:p>
@@ -1609,7 +1609,7 @@
           <a:p>
             <a:fld id="{7C30EC8E-E0C2-4688-8A21-31FBB5C9B8D6}" type="datetimeFigureOut">
               <a:rPr lang="en-GB" smtClean="0"/>
-              <a:t>16/05/2022</a:t>
+              <a:t>01/09/2022</a:t>
             </a:fld>
             <a:endParaRPr lang="en-GB"/>
           </a:p>
@@ -1727,7 +1727,7 @@
           <a:p>
             <a:fld id="{7C30EC8E-E0C2-4688-8A21-31FBB5C9B8D6}" type="datetimeFigureOut">
               <a:rPr lang="en-GB" smtClean="0"/>
-              <a:t>16/05/2022</a:t>
+              <a:t>01/09/2022</a:t>
             </a:fld>
             <a:endParaRPr lang="en-GB"/>
           </a:p>
@@ -1822,7 +1822,7 @@
           <a:p>
             <a:fld id="{7C30EC8E-E0C2-4688-8A21-31FBB5C9B8D6}" type="datetimeFigureOut">
               <a:rPr lang="en-GB" smtClean="0"/>
-              <a:t>16/05/2022</a:t>
+              <a:t>01/09/2022</a:t>
             </a:fld>
             <a:endParaRPr lang="en-GB"/>
           </a:p>
@@ -2099,7 +2099,7 @@
           <a:p>
             <a:fld id="{7C30EC8E-E0C2-4688-8A21-31FBB5C9B8D6}" type="datetimeFigureOut">
               <a:rPr lang="en-GB" smtClean="0"/>
-              <a:t>16/05/2022</a:t>
+              <a:t>01/09/2022</a:t>
             </a:fld>
             <a:endParaRPr lang="en-GB"/>
           </a:p>
@@ -2352,7 +2352,7 @@
           <a:p>
             <a:fld id="{7C30EC8E-E0C2-4688-8A21-31FBB5C9B8D6}" type="datetimeFigureOut">
               <a:rPr lang="en-GB" smtClean="0"/>
-              <a:t>16/05/2022</a:t>
+              <a:t>01/09/2022</a:t>
             </a:fld>
             <a:endParaRPr lang="en-GB"/>
           </a:p>
@@ -2565,7 +2565,7 @@
           <a:p>
             <a:fld id="{7C30EC8E-E0C2-4688-8A21-31FBB5C9B8D6}" type="datetimeFigureOut">
               <a:rPr lang="en-GB" smtClean="0"/>
-              <a:t>16/05/2022</a:t>
+              <a:t>01/09/2022</a:t>
             </a:fld>
             <a:endParaRPr lang="en-GB"/>
           </a:p>
@@ -3158,8 +3158,8 @@
         </p:nvSpPr>
         <p:spPr>
           <a:xfrm>
-            <a:off x="1175040" y="1063737"/>
-            <a:ext cx="1460909" cy="465203"/>
+            <a:off x="1144473" y="1063737"/>
+            <a:ext cx="1521351" cy="465203"/>
           </a:xfrm>
           <a:prstGeom prst="roundRect">
             <a:avLst/>
@@ -3193,7 +3193,7 @@
           <a:p>
             <a:pPr algn="ctr"/>
             <a:r>
-              <a:rPr lang="fr-FR" sz="1400" dirty="0" smtClean="0">
+              <a:rPr lang="fr-FR" sz="1600" dirty="0" smtClean="0">
                 <a:solidFill>
                   <a:schemeClr val="tx1"/>
                 </a:solidFill>
@@ -3201,14 +3201,14 @@
               <a:t>Transformation </a:t>
             </a:r>
             <a:r>
-              <a:rPr lang="fr-FR" sz="1400" dirty="0" err="1" smtClean="0">
+              <a:rPr lang="fr-FR" sz="1600" dirty="0" err="1" smtClean="0">
                 <a:solidFill>
                   <a:schemeClr val="tx1"/>
                 </a:solidFill>
               </a:rPr>
               <a:t>Specification</a:t>
             </a:r>
-            <a:endParaRPr lang="fr-FR" sz="1400" dirty="0" smtClean="0">
+            <a:endParaRPr lang="fr-FR" sz="1600" dirty="0" smtClean="0">
               <a:solidFill>
                 <a:schemeClr val="tx1"/>
               </a:solidFill>
@@ -3227,8 +3227,8 @@
         </p:nvCxnSpPr>
         <p:spPr>
           <a:xfrm>
-            <a:off x="2635949" y="1296339"/>
-            <a:ext cx="373619" cy="1321"/>
+            <a:off x="2665824" y="1296339"/>
+            <a:ext cx="343744" cy="1321"/>
           </a:xfrm>
           <a:prstGeom prst="straightConnector1">
             <a:avLst/>
@@ -3267,7 +3267,7 @@
         <p:spPr>
           <a:xfrm flipH="1" flipV="1">
             <a:off x="801420" y="1296338"/>
-            <a:ext cx="373620" cy="1"/>
+            <a:ext cx="343053" cy="1"/>
           </a:xfrm>
           <a:prstGeom prst="straightConnector1">
             <a:avLst/>
@@ -3303,8 +3303,8 @@
         </p:nvSpPr>
         <p:spPr>
           <a:xfrm>
-            <a:off x="1174349" y="1761541"/>
-            <a:ext cx="1461600" cy="591326"/>
+            <a:off x="1144474" y="1761541"/>
+            <a:ext cx="1521350" cy="591326"/>
           </a:xfrm>
           <a:prstGeom prst="roundRect">
             <a:avLst/>
@@ -3314,7 +3314,7 @@
             <a:solidFill>
               <a:schemeClr val="tx1"/>
             </a:solidFill>
-            <a:prstDash val="sysDot"/>
+            <a:prstDash val="dash"/>
           </a:ln>
         </p:spPr>
         <p:style>
@@ -3339,7 +3339,7 @@
           <a:p>
             <a:pPr algn="ctr"/>
             <a:r>
-              <a:rPr lang="fr-FR" sz="1400" dirty="0">
+              <a:rPr lang="fr-FR" sz="1600" dirty="0">
                 <a:solidFill>
                   <a:schemeClr val="tx1"/>
                 </a:solidFill>
@@ -3347,14 +3347,14 @@
               <a:t>Transformation </a:t>
             </a:r>
             <a:r>
-              <a:rPr lang="fr-FR" sz="1400" dirty="0" err="1">
+              <a:rPr lang="fr-FR" sz="1600" dirty="0" err="1">
                 <a:solidFill>
                   <a:schemeClr val="tx1"/>
                 </a:solidFill>
               </a:rPr>
               <a:t>Execution</a:t>
             </a:r>
-            <a:endParaRPr lang="fr-FR" sz="1400" dirty="0">
+            <a:endParaRPr lang="fr-FR" sz="1600" dirty="0">
               <a:solidFill>
                 <a:schemeClr val="tx1"/>
               </a:solidFill>
@@ -3373,8 +3373,8 @@
         </p:nvCxnSpPr>
         <p:spPr>
           <a:xfrm>
-            <a:off x="2635949" y="2057204"/>
-            <a:ext cx="458524" cy="0"/>
+            <a:off x="2665824" y="2057204"/>
+            <a:ext cx="428649" cy="0"/>
           </a:xfrm>
           <a:prstGeom prst="straightConnector1">
             <a:avLst/>
@@ -3383,7 +3383,7 @@
             <a:solidFill>
               <a:schemeClr val="tx1"/>
             </a:solidFill>
-            <a:prstDash val="sysDot"/>
+            <a:prstDash val="dash"/>
             <a:tailEnd type="arrow"/>
           </a:ln>
         </p:spPr>
@@ -3414,7 +3414,7 @@
         <p:spPr>
           <a:xfrm flipH="1">
             <a:off x="687343" y="2057204"/>
-            <a:ext cx="487006" cy="0"/>
+            <a:ext cx="457131" cy="0"/>
           </a:xfrm>
           <a:prstGeom prst="straightConnector1">
             <a:avLst/>
@@ -3423,7 +3423,7 @@
             <a:solidFill>
               <a:schemeClr val="tx1"/>
             </a:solidFill>
-            <a:prstDash val="sysDot"/>
+            <a:prstDash val="dash"/>
             <a:headEnd type="arrow"/>
             <a:tailEnd type="none"/>
           </a:ln>
@@ -3499,8 +3499,8 @@
         </p:nvSpPr>
         <p:spPr>
           <a:xfrm>
-            <a:off x="1212017" y="101980"/>
-            <a:ext cx="1386264" cy="483572"/>
+            <a:off x="1144473" y="114963"/>
+            <a:ext cx="1521351" cy="483572"/>
           </a:xfrm>
           <a:prstGeom prst="roundRect">
             <a:avLst/>
@@ -3534,7 +3534,7 @@
           <a:p>
             <a:pPr algn="ctr"/>
             <a:r>
-              <a:rPr lang="fr-FR" sz="1400" dirty="0">
+              <a:rPr lang="fr-FR" sz="1600" dirty="0">
                 <a:solidFill>
                   <a:schemeClr val="tx1"/>
                 </a:solidFill>
@@ -3542,14 +3542,14 @@
               <a:t>Transformation </a:t>
             </a:r>
             <a:r>
-              <a:rPr lang="fr-FR" sz="1400" dirty="0" err="1">
+              <a:rPr lang="fr-FR" sz="1600" dirty="0" err="1">
                 <a:solidFill>
                   <a:schemeClr val="tx1"/>
                 </a:solidFill>
               </a:rPr>
               <a:t>Language</a:t>
             </a:r>
-            <a:endParaRPr lang="fr-FR" sz="1400" dirty="0">
+            <a:endParaRPr lang="fr-FR" sz="1600" dirty="0">
               <a:solidFill>
                 <a:schemeClr val="tx1"/>
               </a:solidFill>
@@ -3698,7 +3698,7 @@
         </p:nvSpPr>
         <p:spPr>
           <a:xfrm>
-            <a:off x="3630004" y="151922"/>
+            <a:off x="2103087" y="220746"/>
             <a:ext cx="624758" cy="369332"/>
           </a:xfrm>
           <a:prstGeom prst="rect">
@@ -3736,7 +3736,7 @@
         </p:nvSpPr>
         <p:spPr>
           <a:xfrm>
-            <a:off x="230837" y="150600"/>
+            <a:off x="230837" y="219424"/>
             <a:ext cx="526813" cy="369332"/>
           </a:xfrm>
           <a:prstGeom prst="rect">
@@ -3774,7 +3774,7 @@
         </p:nvSpPr>
         <p:spPr>
           <a:xfrm>
-            <a:off x="189599" y="911466"/>
+            <a:off x="189599" y="980290"/>
             <a:ext cx="599777" cy="369332"/>
           </a:xfrm>
           <a:prstGeom prst="rect">
@@ -3819,7 +3819,7 @@
         </p:nvSpPr>
         <p:spPr>
           <a:xfrm>
-            <a:off x="3743871" y="911466"/>
+            <a:off x="2216954" y="980290"/>
             <a:ext cx="397024" cy="369332"/>
           </a:xfrm>
           <a:prstGeom prst="rect">
@@ -3860,8 +3860,8 @@
         </p:nvCxnSpPr>
         <p:spPr>
           <a:xfrm flipH="1" flipV="1">
-            <a:off x="757650" y="335266"/>
-            <a:ext cx="2872354" cy="1322"/>
+            <a:off x="757650" y="404090"/>
+            <a:ext cx="1345437" cy="1322"/>
           </a:xfrm>
           <a:prstGeom prst="straightConnector1">
             <a:avLst/>
@@ -3899,7 +3899,7 @@
         </p:nvSpPr>
         <p:spPr>
           <a:xfrm>
-            <a:off x="381487" y="578751"/>
+            <a:off x="381487" y="647575"/>
             <a:ext cx="216000" cy="234423"/>
           </a:xfrm>
           <a:prstGeom prst="triangle">
@@ -3947,7 +3947,7 @@
         </p:nvSpPr>
         <p:spPr>
           <a:xfrm>
-            <a:off x="3834383" y="564640"/>
+            <a:off x="2307466" y="633464"/>
             <a:ext cx="216000" cy="234423"/>
           </a:xfrm>
           <a:prstGeom prst="triangle">
@@ -3993,8 +3993,8 @@
         </p:nvSpPr>
         <p:spPr>
           <a:xfrm>
-            <a:off x="3775984" y="1006127"/>
-            <a:ext cx="584521" cy="796017"/>
+            <a:off x="2249067" y="1074951"/>
+            <a:ext cx="926752" cy="796017"/>
           </a:xfrm>
           <a:prstGeom prst="arc">
             <a:avLst>
@@ -4006,7 +4006,7 @@
             <a:solidFill>
               <a:schemeClr val="tx1"/>
             </a:solidFill>
-            <a:prstDash val="sysDot"/>
+            <a:prstDash val="dash"/>
             <a:tailEnd type="arrow"/>
           </a:ln>
         </p:spPr>
@@ -4041,8 +4041,8 @@
         </p:nvSpPr>
         <p:spPr>
           <a:xfrm>
-            <a:off x="370803" y="1006127"/>
-            <a:ext cx="584521" cy="796017"/>
+            <a:off x="370803" y="1074951"/>
+            <a:ext cx="978163" cy="796017"/>
           </a:xfrm>
           <a:prstGeom prst="arc">
             <a:avLst>
@@ -4054,7 +4054,7 @@
             <a:solidFill>
               <a:schemeClr val="tx1"/>
             </a:solidFill>
-            <a:prstDash val="sysDot"/>
+            <a:prstDash val="dash"/>
             <a:tailEnd type="arrow"/>
           </a:ln>
         </p:spPr>
@@ -4089,8 +4089,8 @@
         </p:nvSpPr>
         <p:spPr>
           <a:xfrm>
-            <a:off x="3909819" y="1280798"/>
-            <a:ext cx="979423" cy="307777"/>
+            <a:off x="2675910" y="1332067"/>
+            <a:ext cx="1137046" cy="307777"/>
           </a:xfrm>
           <a:prstGeom prst="rect">
             <a:avLst/>
@@ -4102,7 +4102,7 @@
             <a:solidFill>
               <a:schemeClr val="tx1"/>
             </a:solidFill>
-            <a:prstDash val="sysDot"/>
+            <a:prstDash val="dash"/>
           </a:ln>
         </p:spPr>
         <p:style>
@@ -4189,14 +4189,14 @@
           </a:lstStyle>
           <a:p>
             <a:r>
-              <a:rPr lang="fr-FR" dirty="0">
+              <a:rPr lang="fr-FR" sz="1600" dirty="0">
                 <a:solidFill>
                   <a:schemeClr val="tx1"/>
                 </a:solidFill>
               </a:rPr>
               <a:t>Simulation</a:t>
             </a:r>
-            <a:endParaRPr lang="en-GB" dirty="0">
+            <a:endParaRPr lang="en-GB" sz="1600" dirty="0">
               <a:solidFill>
                 <a:schemeClr val="tx1"/>
               </a:solidFill>
@@ -4212,8 +4212,8 @@
         </p:nvSpPr>
         <p:spPr>
           <a:xfrm>
-            <a:off x="583693" y="1250246"/>
-            <a:ext cx="940104" cy="307777"/>
+            <a:off x="846511" y="1349622"/>
+            <a:ext cx="1078649" cy="277225"/>
           </a:xfrm>
           <a:prstGeom prst="rect">
             <a:avLst/>
@@ -4225,7 +4225,7 @@
             <a:solidFill>
               <a:schemeClr val="tx1"/>
             </a:solidFill>
-            <a:prstDash val="sysDot"/>
+            <a:prstDash val="dash"/>
           </a:ln>
         </p:spPr>
         <p:style>
@@ -4312,7 +4312,7 @@
           </a:lstStyle>
           <a:p>
             <a:r>
-              <a:rPr lang="fr-FR" dirty="0" smtClean="0">
+              <a:rPr lang="fr-FR" sz="1600" dirty="0" smtClean="0">
                 <a:solidFill>
                   <a:schemeClr val="tx1"/>
                 </a:solidFill>
@@ -4335,8 +4335,8 @@
         </p:nvSpPr>
         <p:spPr>
           <a:xfrm>
-            <a:off x="2634961" y="272961"/>
-            <a:ext cx="740570" cy="307777"/>
+            <a:off x="1509493" y="538962"/>
+            <a:ext cx="792455" cy="307777"/>
           </a:xfrm>
           <a:prstGeom prst="rect">
             <a:avLst/>
@@ -4345,9 +4345,7 @@
             <a:schemeClr val="bg1"/>
           </a:solidFill>
           <a:ln w="25400">
-            <a:solidFill>
-              <a:schemeClr val="tx1"/>
-            </a:solidFill>
+            <a:noFill/>
           </a:ln>
         </p:spPr>
         <p:style>
@@ -4382,10 +4380,10 @@
           </a:lstStyle>
           <a:p>
             <a:r>
-              <a:rPr lang="fr-FR" dirty="0" err="1"/>
+              <a:rPr lang="fr-FR" sz="1600" dirty="0" err="1"/>
               <a:t>Parsing</a:t>
             </a:r>
-            <a:endParaRPr lang="en-GB" dirty="0"/>
+            <a:endParaRPr lang="en-GB" sz="1600" dirty="0"/>
           </a:p>
         </p:txBody>
       </p:sp>
@@ -4397,8 +4395,8 @@
         </p:nvSpPr>
         <p:spPr>
           <a:xfrm>
-            <a:off x="1098519" y="89459"/>
-            <a:ext cx="926224" cy="307777"/>
+            <a:off x="443018" y="0"/>
+            <a:ext cx="1135302" cy="307777"/>
           </a:xfrm>
           <a:prstGeom prst="rect">
             <a:avLst/>
@@ -4407,9 +4405,7 @@
             <a:schemeClr val="bg1"/>
           </a:solidFill>
           <a:ln w="25400">
-            <a:solidFill>
-              <a:schemeClr val="tx1"/>
-            </a:solidFill>
+            <a:noFill/>
           </a:ln>
         </p:spPr>
         <p:style>
@@ -4444,10 +4440,10 @@
           </a:lstStyle>
           <a:p>
             <a:r>
-              <a:rPr lang="fr-FR" dirty="0" err="1" smtClean="0"/>
+              <a:rPr lang="fr-FR" sz="1600" dirty="0" err="1"/>
               <a:t>Rendering</a:t>
             </a:r>
-            <a:endParaRPr lang="en-GB" dirty="0"/>
+            <a:endParaRPr lang="en-GB" sz="1600" dirty="0"/>
           </a:p>
         </p:txBody>
       </p:sp>
@@ -4459,8 +4455,8 @@
         </p:nvSpPr>
         <p:spPr>
           <a:xfrm>
-            <a:off x="4050383" y="89459"/>
-            <a:ext cx="297556" cy="822007"/>
+            <a:off x="2523465" y="158283"/>
+            <a:ext cx="501987" cy="822007"/>
           </a:xfrm>
           <a:prstGeom prst="arc">
             <a:avLst>
@@ -4507,8 +4503,8 @@
         </p:nvSpPr>
         <p:spPr>
           <a:xfrm>
-            <a:off x="4208821" y="335266"/>
-            <a:ext cx="979423" cy="307777"/>
+            <a:off x="2662903" y="415397"/>
+            <a:ext cx="1163059" cy="307777"/>
           </a:xfrm>
           <a:prstGeom prst="rect">
             <a:avLst/>
@@ -4607,14 +4603,14 @@
           </a:lstStyle>
           <a:p>
             <a:r>
-              <a:rPr lang="fr-FR" dirty="0">
+              <a:rPr lang="fr-FR" sz="1600" dirty="0">
                 <a:solidFill>
                   <a:schemeClr val="tx1"/>
                 </a:solidFill>
               </a:rPr>
               <a:t>Simulation</a:t>
             </a:r>
-            <a:endParaRPr lang="en-GB" dirty="0">
+            <a:endParaRPr lang="en-GB" sz="1600" dirty="0">
               <a:solidFill>
                 <a:schemeClr val="tx1"/>
               </a:solidFill>

</xml_diff>